<commit_message>
Some Updates in Lecture Slides
</commit_message>
<xml_diff>
--- a/METU-EE402/Lecture 11/Lecture11_Figures.pptx
+++ b/METU-EE402/Lecture 11/Lecture11_Figures.pptx
@@ -5,15 +5,17 @@
     <p:sldMasterId id="2147483648" r:id="rId1"/>
   </p:sldMasterIdLst>
   <p:sldIdLst>
-    <p:sldId id="257" r:id="rId2"/>
-    <p:sldId id="258" r:id="rId3"/>
-    <p:sldId id="259" r:id="rId4"/>
-    <p:sldId id="260" r:id="rId5"/>
-    <p:sldId id="261" r:id="rId6"/>
-    <p:sldId id="262" r:id="rId7"/>
-    <p:sldId id="263" r:id="rId8"/>
-    <p:sldId id="264" r:id="rId9"/>
-    <p:sldId id="265" r:id="rId10"/>
+    <p:sldId id="266" r:id="rId2"/>
+    <p:sldId id="267" r:id="rId3"/>
+    <p:sldId id="257" r:id="rId4"/>
+    <p:sldId id="258" r:id="rId5"/>
+    <p:sldId id="259" r:id="rId6"/>
+    <p:sldId id="260" r:id="rId7"/>
+    <p:sldId id="261" r:id="rId8"/>
+    <p:sldId id="262" r:id="rId9"/>
+    <p:sldId id="263" r:id="rId10"/>
+    <p:sldId id="264" r:id="rId11"/>
+    <p:sldId id="265" r:id="rId12"/>
   </p:sldIdLst>
   <p:sldSz cx="12192000" cy="6858000"/>
   <p:notesSz cx="6858000" cy="9144000"/>
@@ -112,6 +114,11 @@
       </a:defRPr>
     </a:lvl9pPr>
   </p:defaultTextStyle>
+  <p:extLst>
+    <p:ext uri="{EFAFB233-063F-42B5-8137-9DF3F51BA10A}">
+      <p15:sldGuideLst xmlns:p15="http://schemas.microsoft.com/office/powerpoint/2012/main"/>
+    </p:ext>
+  </p:extLst>
 </p:presentation>
 </file>
 
@@ -262,7 +269,7 @@
           <a:p>
             <a:fld id="{28DA16A7-E329-3248-BBD2-06AEB9C9D9B4}" type="datetimeFigureOut">
               <a:rPr lang="en-US" smtClean="0"/>
-              <a:t>4/19/18</a:t>
+              <a:t>11/18/19</a:t>
             </a:fld>
             <a:endParaRPr lang="en-US"/>
           </a:p>
@@ -460,7 +467,7 @@
           <a:p>
             <a:fld id="{28DA16A7-E329-3248-BBD2-06AEB9C9D9B4}" type="datetimeFigureOut">
               <a:rPr lang="en-US" smtClean="0"/>
-              <a:t>4/19/18</a:t>
+              <a:t>11/18/19</a:t>
             </a:fld>
             <a:endParaRPr lang="en-US"/>
           </a:p>
@@ -668,7 +675,7 @@
           <a:p>
             <a:fld id="{28DA16A7-E329-3248-BBD2-06AEB9C9D9B4}" type="datetimeFigureOut">
               <a:rPr lang="en-US" smtClean="0"/>
-              <a:t>4/19/18</a:t>
+              <a:t>11/18/19</a:t>
             </a:fld>
             <a:endParaRPr lang="en-US"/>
           </a:p>
@@ -866,7 +873,7 @@
           <a:p>
             <a:fld id="{28DA16A7-E329-3248-BBD2-06AEB9C9D9B4}" type="datetimeFigureOut">
               <a:rPr lang="en-US" smtClean="0"/>
-              <a:t>4/19/18</a:t>
+              <a:t>11/18/19</a:t>
             </a:fld>
             <a:endParaRPr lang="en-US"/>
           </a:p>
@@ -1141,7 +1148,7 @@
           <a:p>
             <a:fld id="{28DA16A7-E329-3248-BBD2-06AEB9C9D9B4}" type="datetimeFigureOut">
               <a:rPr lang="en-US" smtClean="0"/>
-              <a:t>4/19/18</a:t>
+              <a:t>11/18/19</a:t>
             </a:fld>
             <a:endParaRPr lang="en-US"/>
           </a:p>
@@ -1406,7 +1413,7 @@
           <a:p>
             <a:fld id="{28DA16A7-E329-3248-BBD2-06AEB9C9D9B4}" type="datetimeFigureOut">
               <a:rPr lang="en-US" smtClean="0"/>
-              <a:t>4/19/18</a:t>
+              <a:t>11/18/19</a:t>
             </a:fld>
             <a:endParaRPr lang="en-US"/>
           </a:p>
@@ -1818,7 +1825,7 @@
           <a:p>
             <a:fld id="{28DA16A7-E329-3248-BBD2-06AEB9C9D9B4}" type="datetimeFigureOut">
               <a:rPr lang="en-US" smtClean="0"/>
-              <a:t>4/19/18</a:t>
+              <a:t>11/18/19</a:t>
             </a:fld>
             <a:endParaRPr lang="en-US"/>
           </a:p>
@@ -1959,7 +1966,7 @@
           <a:p>
             <a:fld id="{28DA16A7-E329-3248-BBD2-06AEB9C9D9B4}" type="datetimeFigureOut">
               <a:rPr lang="en-US" smtClean="0"/>
-              <a:t>4/19/18</a:t>
+              <a:t>11/18/19</a:t>
             </a:fld>
             <a:endParaRPr lang="en-US"/>
           </a:p>
@@ -2072,7 +2079,7 @@
           <a:p>
             <a:fld id="{28DA16A7-E329-3248-BBD2-06AEB9C9D9B4}" type="datetimeFigureOut">
               <a:rPr lang="en-US" smtClean="0"/>
-              <a:t>4/19/18</a:t>
+              <a:t>11/18/19</a:t>
             </a:fld>
             <a:endParaRPr lang="en-US"/>
           </a:p>
@@ -2383,7 +2390,7 @@
           <a:p>
             <a:fld id="{28DA16A7-E329-3248-BBD2-06AEB9C9D9B4}" type="datetimeFigureOut">
               <a:rPr lang="en-US" smtClean="0"/>
-              <a:t>4/19/18</a:t>
+              <a:t>11/18/19</a:t>
             </a:fld>
             <a:endParaRPr lang="en-US"/>
           </a:p>
@@ -2671,7 +2678,7 @@
           <a:p>
             <a:fld id="{28DA16A7-E329-3248-BBD2-06AEB9C9D9B4}" type="datetimeFigureOut">
               <a:rPr lang="en-US" smtClean="0"/>
-              <a:t>4/19/18</a:t>
+              <a:t>11/18/19</a:t>
             </a:fld>
             <a:endParaRPr lang="en-US"/>
           </a:p>
@@ -2912,7 +2919,7 @@
           <a:p>
             <a:fld id="{28DA16A7-E329-3248-BBD2-06AEB9C9D9B4}" type="datetimeFigureOut">
               <a:rPr lang="en-US" smtClean="0"/>
-              <a:t>4/19/18</a:t>
+              <a:t>11/18/19</a:t>
             </a:fld>
             <a:endParaRPr lang="en-US"/>
           </a:p>
@@ -3331,6 +3338,246 @@
       </p:grpSpPr>
       <p:pic>
         <p:nvPicPr>
+          <p:cNvPr id="5" name="Picture 4">
+            <a:extLst>
+              <a:ext uri="{FF2B5EF4-FFF2-40B4-BE49-F238E27FC236}">
+                <a16:creationId xmlns:a16="http://schemas.microsoft.com/office/drawing/2014/main" id="{93D6935A-CDEA-5847-ACFC-359CE64FBAE3}"/>
+              </a:ext>
+            </a:extLst>
+          </p:cNvPr>
+          <p:cNvPicPr>
+            <a:picLocks noChangeAspect="1"/>
+          </p:cNvPicPr>
+          <p:nvPr/>
+        </p:nvPicPr>
+        <p:blipFill>
+          <a:blip r:embed="rId2"/>
+          <a:stretch>
+            <a:fillRect/>
+          </a:stretch>
+        </p:blipFill>
+        <p:spPr>
+          <a:xfrm>
+            <a:off x="627651" y="3103295"/>
+            <a:ext cx="10779376" cy="985820"/>
+          </a:xfrm>
+          <a:prstGeom prst="rect">
+            <a:avLst/>
+          </a:prstGeom>
+        </p:spPr>
+      </p:pic>
+    </p:spTree>
+    <p:extLst>
+      <p:ext uri="{BB962C8B-B14F-4D97-AF65-F5344CB8AC3E}">
+        <p14:creationId xmlns:p14="http://schemas.microsoft.com/office/powerpoint/2010/main" val="4101946275"/>
+      </p:ext>
+    </p:extLst>
+  </p:cSld>
+  <p:clrMapOvr>
+    <a:masterClrMapping/>
+  </p:clrMapOvr>
+</p:sld>
+</file>
+
+<file path=ppt/slides/slide10.xml><?xml version="1.0" encoding="utf-8"?>
+<p:sld xmlns:a="http://schemas.openxmlformats.org/drawingml/2006/main" xmlns:r="http://schemas.openxmlformats.org/officeDocument/2006/relationships" xmlns:p="http://schemas.openxmlformats.org/presentationml/2006/main">
+  <p:cSld>
+    <p:spTree>
+      <p:nvGrpSpPr>
+        <p:cNvPr id="1" name=""/>
+        <p:cNvGrpSpPr/>
+        <p:nvPr/>
+      </p:nvGrpSpPr>
+      <p:grpSpPr>
+        <a:xfrm>
+          <a:off x="0" y="0"/>
+          <a:ext cx="0" cy="0"/>
+          <a:chOff x="0" y="0"/>
+          <a:chExt cx="0" cy="0"/>
+        </a:xfrm>
+      </p:grpSpPr>
+      <p:pic>
+        <p:nvPicPr>
+          <p:cNvPr id="5" name="Picture 4">
+            <a:extLst>
+              <a:ext uri="{FF2B5EF4-FFF2-40B4-BE49-F238E27FC236}">
+                <a16:creationId xmlns:a16="http://schemas.microsoft.com/office/drawing/2014/main" id="{21B1B38C-7E3E-234B-8CFE-27CCB9692609}"/>
+              </a:ext>
+            </a:extLst>
+          </p:cNvPr>
+          <p:cNvPicPr>
+            <a:picLocks noChangeAspect="1"/>
+          </p:cNvPicPr>
+          <p:nvPr/>
+        </p:nvPicPr>
+        <p:blipFill>
+          <a:blip r:embed="rId2"/>
+          <a:stretch>
+            <a:fillRect/>
+          </a:stretch>
+        </p:blipFill>
+        <p:spPr>
+          <a:xfrm>
+            <a:off x="2133600" y="-1019735"/>
+            <a:ext cx="7073900" cy="9154458"/>
+          </a:xfrm>
+          <a:prstGeom prst="rect">
+            <a:avLst/>
+          </a:prstGeom>
+        </p:spPr>
+      </p:pic>
+    </p:spTree>
+    <p:extLst>
+      <p:ext uri="{BB962C8B-B14F-4D97-AF65-F5344CB8AC3E}">
+        <p14:creationId xmlns:p14="http://schemas.microsoft.com/office/powerpoint/2010/main" val="2433490520"/>
+      </p:ext>
+    </p:extLst>
+  </p:cSld>
+  <p:clrMapOvr>
+    <a:masterClrMapping/>
+  </p:clrMapOvr>
+</p:sld>
+</file>
+
+<file path=ppt/slides/slide11.xml><?xml version="1.0" encoding="utf-8"?>
+<p:sld xmlns:a="http://schemas.openxmlformats.org/drawingml/2006/main" xmlns:r="http://schemas.openxmlformats.org/officeDocument/2006/relationships" xmlns:p="http://schemas.openxmlformats.org/presentationml/2006/main">
+  <p:cSld>
+    <p:spTree>
+      <p:nvGrpSpPr>
+        <p:cNvPr id="1" name=""/>
+        <p:cNvGrpSpPr/>
+        <p:nvPr/>
+      </p:nvGrpSpPr>
+      <p:grpSpPr>
+        <a:xfrm>
+          <a:off x="0" y="0"/>
+          <a:ext cx="0" cy="0"/>
+          <a:chOff x="0" y="0"/>
+          <a:chExt cx="0" cy="0"/>
+        </a:xfrm>
+      </p:grpSpPr>
+      <p:pic>
+        <p:nvPicPr>
+          <p:cNvPr id="5" name="Picture 4">
+            <a:extLst>
+              <a:ext uri="{FF2B5EF4-FFF2-40B4-BE49-F238E27FC236}">
+                <a16:creationId xmlns:a16="http://schemas.microsoft.com/office/drawing/2014/main" id="{158F5F0C-88D0-7D4E-93C3-CE3A7920B431}"/>
+              </a:ext>
+            </a:extLst>
+          </p:cNvPr>
+          <p:cNvPicPr>
+            <a:picLocks noChangeAspect="1"/>
+          </p:cNvPicPr>
+          <p:nvPr/>
+        </p:nvPicPr>
+        <p:blipFill>
+          <a:blip r:embed="rId2"/>
+          <a:stretch>
+            <a:fillRect/>
+          </a:stretch>
+        </p:blipFill>
+        <p:spPr>
+          <a:xfrm>
+            <a:off x="2082800" y="-1151964"/>
+            <a:ext cx="6921500" cy="8957235"/>
+          </a:xfrm>
+          <a:prstGeom prst="rect">
+            <a:avLst/>
+          </a:prstGeom>
+        </p:spPr>
+      </p:pic>
+    </p:spTree>
+    <p:extLst>
+      <p:ext uri="{BB962C8B-B14F-4D97-AF65-F5344CB8AC3E}">
+        <p14:creationId xmlns:p14="http://schemas.microsoft.com/office/powerpoint/2010/main" val="3345347061"/>
+      </p:ext>
+    </p:extLst>
+  </p:cSld>
+  <p:clrMapOvr>
+    <a:masterClrMapping/>
+  </p:clrMapOvr>
+</p:sld>
+</file>
+
+<file path=ppt/slides/slide2.xml><?xml version="1.0" encoding="utf-8"?>
+<p:sld xmlns:a="http://schemas.openxmlformats.org/drawingml/2006/main" xmlns:r="http://schemas.openxmlformats.org/officeDocument/2006/relationships" xmlns:p="http://schemas.openxmlformats.org/presentationml/2006/main">
+  <p:cSld>
+    <p:spTree>
+      <p:nvGrpSpPr>
+        <p:cNvPr id="1" name=""/>
+        <p:cNvGrpSpPr/>
+        <p:nvPr/>
+      </p:nvGrpSpPr>
+      <p:grpSpPr>
+        <a:xfrm>
+          <a:off x="0" y="0"/>
+          <a:ext cx="0" cy="0"/>
+          <a:chOff x="0" y="0"/>
+          <a:chExt cx="0" cy="0"/>
+        </a:xfrm>
+      </p:grpSpPr>
+      <p:pic>
+        <p:nvPicPr>
+          <p:cNvPr id="3" name="Picture 2">
+            <a:extLst>
+              <a:ext uri="{FF2B5EF4-FFF2-40B4-BE49-F238E27FC236}">
+                <a16:creationId xmlns:a16="http://schemas.microsoft.com/office/drawing/2014/main" id="{B8E18339-3D71-9147-A8D9-C189497BAFBF}"/>
+              </a:ext>
+            </a:extLst>
+          </p:cNvPr>
+          <p:cNvPicPr>
+            <a:picLocks noChangeAspect="1"/>
+          </p:cNvPicPr>
+          <p:nvPr/>
+        </p:nvPicPr>
+        <p:blipFill>
+          <a:blip r:embed="rId2"/>
+          <a:stretch>
+            <a:fillRect/>
+          </a:stretch>
+        </p:blipFill>
+        <p:spPr>
+          <a:xfrm>
+            <a:off x="2918482" y="184935"/>
+            <a:ext cx="6064028" cy="6565187"/>
+          </a:xfrm>
+          <a:prstGeom prst="rect">
+            <a:avLst/>
+          </a:prstGeom>
+        </p:spPr>
+      </p:pic>
+    </p:spTree>
+    <p:extLst>
+      <p:ext uri="{BB962C8B-B14F-4D97-AF65-F5344CB8AC3E}">
+        <p14:creationId xmlns:p14="http://schemas.microsoft.com/office/powerpoint/2010/main" val="300689771"/>
+      </p:ext>
+    </p:extLst>
+  </p:cSld>
+  <p:clrMapOvr>
+    <a:masterClrMapping/>
+  </p:clrMapOvr>
+</p:sld>
+</file>
+
+<file path=ppt/slides/slide3.xml><?xml version="1.0" encoding="utf-8"?>
+<p:sld xmlns:a="http://schemas.openxmlformats.org/drawingml/2006/main" xmlns:r="http://schemas.openxmlformats.org/officeDocument/2006/relationships" xmlns:p="http://schemas.openxmlformats.org/presentationml/2006/main">
+  <p:cSld>
+    <p:spTree>
+      <p:nvGrpSpPr>
+        <p:cNvPr id="1" name=""/>
+        <p:cNvGrpSpPr/>
+        <p:nvPr/>
+      </p:nvGrpSpPr>
+      <p:grpSpPr>
+        <a:xfrm>
+          <a:off x="0" y="0"/>
+          <a:ext cx="0" cy="0"/>
+          <a:chOff x="0" y="0"/>
+          <a:chExt cx="0" cy="0"/>
+        </a:xfrm>
+      </p:grpSpPr>
+      <p:pic>
+        <p:nvPicPr>
           <p:cNvPr id="6" name="Picture 5">
             <a:extLst>
               <a:ext uri="{FF2B5EF4-FFF2-40B4-BE49-F238E27FC236}">
@@ -3372,7 +3619,7 @@
 </p:sld>
 </file>
 
-<file path=ppt/slides/slide2.xml><?xml version="1.0" encoding="utf-8"?>
+<file path=ppt/slides/slide4.xml><?xml version="1.0" encoding="utf-8"?>
 <p:sld xmlns:a="http://schemas.openxmlformats.org/drawingml/2006/main" xmlns:r="http://schemas.openxmlformats.org/officeDocument/2006/relationships" xmlns:p="http://schemas.openxmlformats.org/presentationml/2006/main">
   <p:cSld>
     <p:spTree>
@@ -3432,7 +3679,7 @@
 </p:sld>
 </file>
 
-<file path=ppt/slides/slide3.xml><?xml version="1.0" encoding="utf-8"?>
+<file path=ppt/slides/slide5.xml><?xml version="1.0" encoding="utf-8"?>
 <p:sld xmlns:a="http://schemas.openxmlformats.org/drawingml/2006/main" xmlns:r="http://schemas.openxmlformats.org/officeDocument/2006/relationships" xmlns:p="http://schemas.openxmlformats.org/presentationml/2006/main">
   <p:cSld>
     <p:spTree>
@@ -3492,7 +3739,7 @@
 </p:sld>
 </file>
 
-<file path=ppt/slides/slide4.xml><?xml version="1.0" encoding="utf-8"?>
+<file path=ppt/slides/slide6.xml><?xml version="1.0" encoding="utf-8"?>
 <p:sld xmlns:a="http://schemas.openxmlformats.org/drawingml/2006/main" xmlns:r="http://schemas.openxmlformats.org/officeDocument/2006/relationships" xmlns:p="http://schemas.openxmlformats.org/presentationml/2006/main">
   <p:cSld>
     <p:spTree>
@@ -3552,7 +3799,7 @@
 </p:sld>
 </file>
 
-<file path=ppt/slides/slide5.xml><?xml version="1.0" encoding="utf-8"?>
+<file path=ppt/slides/slide7.xml><?xml version="1.0" encoding="utf-8"?>
 <p:sld xmlns:a="http://schemas.openxmlformats.org/drawingml/2006/main" xmlns:r="http://schemas.openxmlformats.org/officeDocument/2006/relationships" xmlns:p="http://schemas.openxmlformats.org/presentationml/2006/main">
   <p:cSld>
     <p:spTree>
@@ -3612,7 +3859,7 @@
 </p:sld>
 </file>
 
-<file path=ppt/slides/slide6.xml><?xml version="1.0" encoding="utf-8"?>
+<file path=ppt/slides/slide8.xml><?xml version="1.0" encoding="utf-8"?>
 <p:sld xmlns:a="http://schemas.openxmlformats.org/drawingml/2006/main" xmlns:r="http://schemas.openxmlformats.org/officeDocument/2006/relationships" xmlns:p="http://schemas.openxmlformats.org/presentationml/2006/main">
   <p:cSld>
     <p:spTree>
@@ -3672,7 +3919,7 @@
 </p:sld>
 </file>
 
-<file path=ppt/slides/slide7.xml><?xml version="1.0" encoding="utf-8"?>
+<file path=ppt/slides/slide9.xml><?xml version="1.0" encoding="utf-8"?>
 <p:sld xmlns:a="http://schemas.openxmlformats.org/drawingml/2006/main" xmlns:r="http://schemas.openxmlformats.org/officeDocument/2006/relationships" xmlns:p="http://schemas.openxmlformats.org/presentationml/2006/main">
   <p:cSld>
     <p:spTree>
@@ -3723,126 +3970,6 @@
     <p:extLst>
       <p:ext uri="{BB962C8B-B14F-4D97-AF65-F5344CB8AC3E}">
         <p14:creationId xmlns:p14="http://schemas.microsoft.com/office/powerpoint/2010/main" val="2679762953"/>
-      </p:ext>
-    </p:extLst>
-  </p:cSld>
-  <p:clrMapOvr>
-    <a:masterClrMapping/>
-  </p:clrMapOvr>
-</p:sld>
-</file>
-
-<file path=ppt/slides/slide8.xml><?xml version="1.0" encoding="utf-8"?>
-<p:sld xmlns:a="http://schemas.openxmlformats.org/drawingml/2006/main" xmlns:r="http://schemas.openxmlformats.org/officeDocument/2006/relationships" xmlns:p="http://schemas.openxmlformats.org/presentationml/2006/main">
-  <p:cSld>
-    <p:spTree>
-      <p:nvGrpSpPr>
-        <p:cNvPr id="1" name=""/>
-        <p:cNvGrpSpPr/>
-        <p:nvPr/>
-      </p:nvGrpSpPr>
-      <p:grpSpPr>
-        <a:xfrm>
-          <a:off x="0" y="0"/>
-          <a:ext cx="0" cy="0"/>
-          <a:chOff x="0" y="0"/>
-          <a:chExt cx="0" cy="0"/>
-        </a:xfrm>
-      </p:grpSpPr>
-      <p:pic>
-        <p:nvPicPr>
-          <p:cNvPr id="5" name="Picture 4">
-            <a:extLst>
-              <a:ext uri="{FF2B5EF4-FFF2-40B4-BE49-F238E27FC236}">
-                <a16:creationId xmlns:a16="http://schemas.microsoft.com/office/drawing/2014/main" id="{21B1B38C-7E3E-234B-8CFE-27CCB9692609}"/>
-              </a:ext>
-            </a:extLst>
-          </p:cNvPr>
-          <p:cNvPicPr>
-            <a:picLocks noChangeAspect="1"/>
-          </p:cNvPicPr>
-          <p:nvPr/>
-        </p:nvPicPr>
-        <p:blipFill>
-          <a:blip r:embed="rId2"/>
-          <a:stretch>
-            <a:fillRect/>
-          </a:stretch>
-        </p:blipFill>
-        <p:spPr>
-          <a:xfrm>
-            <a:off x="2133600" y="-1019735"/>
-            <a:ext cx="7073900" cy="9154458"/>
-          </a:xfrm>
-          <a:prstGeom prst="rect">
-            <a:avLst/>
-          </a:prstGeom>
-        </p:spPr>
-      </p:pic>
-    </p:spTree>
-    <p:extLst>
-      <p:ext uri="{BB962C8B-B14F-4D97-AF65-F5344CB8AC3E}">
-        <p14:creationId xmlns:p14="http://schemas.microsoft.com/office/powerpoint/2010/main" val="2433490520"/>
-      </p:ext>
-    </p:extLst>
-  </p:cSld>
-  <p:clrMapOvr>
-    <a:masterClrMapping/>
-  </p:clrMapOvr>
-</p:sld>
-</file>
-
-<file path=ppt/slides/slide9.xml><?xml version="1.0" encoding="utf-8"?>
-<p:sld xmlns:a="http://schemas.openxmlformats.org/drawingml/2006/main" xmlns:r="http://schemas.openxmlformats.org/officeDocument/2006/relationships" xmlns:p="http://schemas.openxmlformats.org/presentationml/2006/main">
-  <p:cSld>
-    <p:spTree>
-      <p:nvGrpSpPr>
-        <p:cNvPr id="1" name=""/>
-        <p:cNvGrpSpPr/>
-        <p:nvPr/>
-      </p:nvGrpSpPr>
-      <p:grpSpPr>
-        <a:xfrm>
-          <a:off x="0" y="0"/>
-          <a:ext cx="0" cy="0"/>
-          <a:chOff x="0" y="0"/>
-          <a:chExt cx="0" cy="0"/>
-        </a:xfrm>
-      </p:grpSpPr>
-      <p:pic>
-        <p:nvPicPr>
-          <p:cNvPr id="5" name="Picture 4">
-            <a:extLst>
-              <a:ext uri="{FF2B5EF4-FFF2-40B4-BE49-F238E27FC236}">
-                <a16:creationId xmlns:a16="http://schemas.microsoft.com/office/drawing/2014/main" id="{158F5F0C-88D0-7D4E-93C3-CE3A7920B431}"/>
-              </a:ext>
-            </a:extLst>
-          </p:cNvPr>
-          <p:cNvPicPr>
-            <a:picLocks noChangeAspect="1"/>
-          </p:cNvPicPr>
-          <p:nvPr/>
-        </p:nvPicPr>
-        <p:blipFill>
-          <a:blip r:embed="rId2"/>
-          <a:stretch>
-            <a:fillRect/>
-          </a:stretch>
-        </p:blipFill>
-        <p:spPr>
-          <a:xfrm>
-            <a:off x="2082800" y="-1151964"/>
-            <a:ext cx="6921500" cy="8957235"/>
-          </a:xfrm>
-          <a:prstGeom prst="rect">
-            <a:avLst/>
-          </a:prstGeom>
-        </p:spPr>
-      </p:pic>
-    </p:spTree>
-    <p:extLst>
-      <p:ext uri="{BB962C8B-B14F-4D97-AF65-F5344CB8AC3E}">
-        <p14:creationId xmlns:p14="http://schemas.microsoft.com/office/powerpoint/2010/main" val="3345347061"/>
       </p:ext>
     </p:extLst>
   </p:cSld>

</xml_diff>